<commit_message>
integrate latests changes from remote repositories into new-arch packages
</commit_message>
<xml_diff>
--- a/packages/jsreport-pptx/test/image.pptx
+++ b/packages/jsreport-pptx/test/image.pptx
@@ -166,10 +166,9 @@
           </a:lstStyle>
           <a:p>
             <a:r>
-              <a:rPr lang="en-US" smtClean="0"/>
+              <a:rPr lang="en-US"/>
               <a:t>Click to edit Master title style</a:t>
             </a:r>
-            <a:endParaRPr lang="en-US"/>
           </a:p>
         </p:txBody>
       </p:sp>
@@ -231,10 +230,9 @@
           </a:lstStyle>
           <a:p>
             <a:r>
-              <a:rPr lang="en-US" smtClean="0"/>
+              <a:rPr lang="en-US"/>
               <a:t>Click to edit Master subtitle style</a:t>
             </a:r>
-            <a:endParaRPr lang="en-US"/>
           </a:p>
         </p:txBody>
       </p:sp>
@@ -255,7 +253,7 @@
           <a:p>
             <a:fld id="{2ED272F6-9B9E-464E-930C-D9DEE297FFC5}" type="datetimeFigureOut">
               <a:rPr lang="en-US" smtClean="0"/>
-              <a:t>6/13/2019</a:t>
+              <a:t>3/11/2021</a:t>
             </a:fld>
             <a:endParaRPr lang="en-US"/>
           </a:p>
@@ -349,10 +347,9 @@
           <a:lstStyle/>
           <a:p>
             <a:r>
-              <a:rPr lang="en-US" smtClean="0"/>
+              <a:rPr lang="en-US"/>
               <a:t>Click to edit Master title style</a:t>
             </a:r>
-            <a:endParaRPr lang="en-US"/>
           </a:p>
         </p:txBody>
       </p:sp>
@@ -373,38 +370,37 @@
           <a:p>
             <a:pPr lvl="0"/>
             <a:r>
-              <a:rPr lang="en-US" smtClean="0"/>
+              <a:rPr lang="en-US"/>
               <a:t>Click to edit Master text styles</a:t>
             </a:r>
           </a:p>
           <a:p>
             <a:pPr lvl="1"/>
             <a:r>
-              <a:rPr lang="en-US" smtClean="0"/>
+              <a:rPr lang="en-US"/>
               <a:t>Second level</a:t>
             </a:r>
           </a:p>
           <a:p>
             <a:pPr lvl="2"/>
             <a:r>
-              <a:rPr lang="en-US" smtClean="0"/>
+              <a:rPr lang="en-US"/>
               <a:t>Third level</a:t>
             </a:r>
           </a:p>
           <a:p>
             <a:pPr lvl="3"/>
             <a:r>
-              <a:rPr lang="en-US" smtClean="0"/>
+              <a:rPr lang="en-US"/>
               <a:t>Fourth level</a:t>
             </a:r>
           </a:p>
           <a:p>
             <a:pPr lvl="4"/>
             <a:r>
-              <a:rPr lang="en-US" smtClean="0"/>
+              <a:rPr lang="en-US"/>
               <a:t>Fifth level</a:t>
             </a:r>
-            <a:endParaRPr lang="en-US"/>
           </a:p>
         </p:txBody>
       </p:sp>
@@ -425,7 +421,7 @@
           <a:p>
             <a:fld id="{2ED272F6-9B9E-464E-930C-D9DEE297FFC5}" type="datetimeFigureOut">
               <a:rPr lang="en-US" smtClean="0"/>
-              <a:t>6/13/2019</a:t>
+              <a:t>3/11/2021</a:t>
             </a:fld>
             <a:endParaRPr lang="en-US"/>
           </a:p>
@@ -524,10 +520,9 @@
           <a:lstStyle/>
           <a:p>
             <a:r>
-              <a:rPr lang="en-US" smtClean="0"/>
+              <a:rPr lang="en-US"/>
               <a:t>Click to edit Master title style</a:t>
             </a:r>
-            <a:endParaRPr lang="en-US"/>
           </a:p>
         </p:txBody>
       </p:sp>
@@ -553,38 +548,37 @@
           <a:p>
             <a:pPr lvl="0"/>
             <a:r>
-              <a:rPr lang="en-US" smtClean="0"/>
+              <a:rPr lang="en-US"/>
               <a:t>Click to edit Master text styles</a:t>
             </a:r>
           </a:p>
           <a:p>
             <a:pPr lvl="1"/>
             <a:r>
-              <a:rPr lang="en-US" smtClean="0"/>
+              <a:rPr lang="en-US"/>
               <a:t>Second level</a:t>
             </a:r>
           </a:p>
           <a:p>
             <a:pPr lvl="2"/>
             <a:r>
-              <a:rPr lang="en-US" smtClean="0"/>
+              <a:rPr lang="en-US"/>
               <a:t>Third level</a:t>
             </a:r>
           </a:p>
           <a:p>
             <a:pPr lvl="3"/>
             <a:r>
-              <a:rPr lang="en-US" smtClean="0"/>
+              <a:rPr lang="en-US"/>
               <a:t>Fourth level</a:t>
             </a:r>
           </a:p>
           <a:p>
             <a:pPr lvl="4"/>
             <a:r>
-              <a:rPr lang="en-US" smtClean="0"/>
+              <a:rPr lang="en-US"/>
               <a:t>Fifth level</a:t>
             </a:r>
-            <a:endParaRPr lang="en-US"/>
           </a:p>
         </p:txBody>
       </p:sp>
@@ -605,7 +599,7 @@
           <a:p>
             <a:fld id="{2ED272F6-9B9E-464E-930C-D9DEE297FFC5}" type="datetimeFigureOut">
               <a:rPr lang="en-US" smtClean="0"/>
-              <a:t>6/13/2019</a:t>
+              <a:t>3/11/2021</a:t>
             </a:fld>
             <a:endParaRPr lang="en-US"/>
           </a:p>
@@ -699,10 +693,9 @@
           <a:lstStyle/>
           <a:p>
             <a:r>
-              <a:rPr lang="en-US" smtClean="0"/>
+              <a:rPr lang="en-US"/>
               <a:t>Click to edit Master title style</a:t>
             </a:r>
-            <a:endParaRPr lang="en-US"/>
           </a:p>
         </p:txBody>
       </p:sp>
@@ -723,38 +716,37 @@
           <a:p>
             <a:pPr lvl="0"/>
             <a:r>
-              <a:rPr lang="en-US" smtClean="0"/>
+              <a:rPr lang="en-US"/>
               <a:t>Click to edit Master text styles</a:t>
             </a:r>
           </a:p>
           <a:p>
             <a:pPr lvl="1"/>
             <a:r>
-              <a:rPr lang="en-US" smtClean="0"/>
+              <a:rPr lang="en-US"/>
               <a:t>Second level</a:t>
             </a:r>
           </a:p>
           <a:p>
             <a:pPr lvl="2"/>
             <a:r>
-              <a:rPr lang="en-US" smtClean="0"/>
+              <a:rPr lang="en-US"/>
               <a:t>Third level</a:t>
             </a:r>
           </a:p>
           <a:p>
             <a:pPr lvl="3"/>
             <a:r>
-              <a:rPr lang="en-US" smtClean="0"/>
+              <a:rPr lang="en-US"/>
               <a:t>Fourth level</a:t>
             </a:r>
           </a:p>
           <a:p>
             <a:pPr lvl="4"/>
             <a:r>
-              <a:rPr lang="en-US" smtClean="0"/>
+              <a:rPr lang="en-US"/>
               <a:t>Fifth level</a:t>
             </a:r>
-            <a:endParaRPr lang="en-US"/>
           </a:p>
         </p:txBody>
       </p:sp>
@@ -775,7 +767,7 @@
           <a:p>
             <a:fld id="{2ED272F6-9B9E-464E-930C-D9DEE297FFC5}" type="datetimeFigureOut">
               <a:rPr lang="en-US" smtClean="0"/>
-              <a:t>6/13/2019</a:t>
+              <a:t>3/11/2021</a:t>
             </a:fld>
             <a:endParaRPr lang="en-US"/>
           </a:p>
@@ -878,10 +870,9 @@
           </a:lstStyle>
           <a:p>
             <a:r>
-              <a:rPr lang="en-US" smtClean="0"/>
+              <a:rPr lang="en-US"/>
               <a:t>Click to edit Master title style</a:t>
             </a:r>
-            <a:endParaRPr lang="en-US"/>
           </a:p>
         </p:txBody>
       </p:sp>
@@ -998,7 +989,7 @@
           <a:p>
             <a:pPr lvl="0"/>
             <a:r>
-              <a:rPr lang="en-US" smtClean="0"/>
+              <a:rPr lang="en-US"/>
               <a:t>Click to edit Master text styles</a:t>
             </a:r>
           </a:p>
@@ -1021,7 +1012,7 @@
           <a:p>
             <a:fld id="{2ED272F6-9B9E-464E-930C-D9DEE297FFC5}" type="datetimeFigureOut">
               <a:rPr lang="en-US" smtClean="0"/>
-              <a:t>6/13/2019</a:t>
+              <a:t>3/11/2021</a:t>
             </a:fld>
             <a:endParaRPr lang="en-US"/>
           </a:p>
@@ -1115,10 +1106,9 @@
           <a:lstStyle/>
           <a:p>
             <a:r>
-              <a:rPr lang="en-US" smtClean="0"/>
+              <a:rPr lang="en-US"/>
               <a:t>Click to edit Master title style</a:t>
             </a:r>
-            <a:endParaRPr lang="en-US"/>
           </a:p>
         </p:txBody>
       </p:sp>
@@ -1144,38 +1134,37 @@
           <a:p>
             <a:pPr lvl="0"/>
             <a:r>
-              <a:rPr lang="en-US" smtClean="0"/>
+              <a:rPr lang="en-US"/>
               <a:t>Click to edit Master text styles</a:t>
             </a:r>
           </a:p>
           <a:p>
             <a:pPr lvl="1"/>
             <a:r>
-              <a:rPr lang="en-US" smtClean="0"/>
+              <a:rPr lang="en-US"/>
               <a:t>Second level</a:t>
             </a:r>
           </a:p>
           <a:p>
             <a:pPr lvl="2"/>
             <a:r>
-              <a:rPr lang="en-US" smtClean="0"/>
+              <a:rPr lang="en-US"/>
               <a:t>Third level</a:t>
             </a:r>
           </a:p>
           <a:p>
             <a:pPr lvl="3"/>
             <a:r>
-              <a:rPr lang="en-US" smtClean="0"/>
+              <a:rPr lang="en-US"/>
               <a:t>Fourth level</a:t>
             </a:r>
           </a:p>
           <a:p>
             <a:pPr lvl="4"/>
             <a:r>
-              <a:rPr lang="en-US" smtClean="0"/>
+              <a:rPr lang="en-US"/>
               <a:t>Fifth level</a:t>
             </a:r>
-            <a:endParaRPr lang="en-US"/>
           </a:p>
         </p:txBody>
       </p:sp>
@@ -1201,38 +1190,37 @@
           <a:p>
             <a:pPr lvl="0"/>
             <a:r>
-              <a:rPr lang="en-US" smtClean="0"/>
+              <a:rPr lang="en-US"/>
               <a:t>Click to edit Master text styles</a:t>
             </a:r>
           </a:p>
           <a:p>
             <a:pPr lvl="1"/>
             <a:r>
-              <a:rPr lang="en-US" smtClean="0"/>
+              <a:rPr lang="en-US"/>
               <a:t>Second level</a:t>
             </a:r>
           </a:p>
           <a:p>
             <a:pPr lvl="2"/>
             <a:r>
-              <a:rPr lang="en-US" smtClean="0"/>
+              <a:rPr lang="en-US"/>
               <a:t>Third level</a:t>
             </a:r>
           </a:p>
           <a:p>
             <a:pPr lvl="3"/>
             <a:r>
-              <a:rPr lang="en-US" smtClean="0"/>
+              <a:rPr lang="en-US"/>
               <a:t>Fourth level</a:t>
             </a:r>
           </a:p>
           <a:p>
             <a:pPr lvl="4"/>
             <a:r>
-              <a:rPr lang="en-US" smtClean="0"/>
+              <a:rPr lang="en-US"/>
               <a:t>Fifth level</a:t>
             </a:r>
-            <a:endParaRPr lang="en-US"/>
           </a:p>
         </p:txBody>
       </p:sp>
@@ -1253,7 +1241,7 @@
           <a:p>
             <a:fld id="{2ED272F6-9B9E-464E-930C-D9DEE297FFC5}" type="datetimeFigureOut">
               <a:rPr lang="en-US" smtClean="0"/>
-              <a:t>6/13/2019</a:t>
+              <a:t>3/11/2021</a:t>
             </a:fld>
             <a:endParaRPr lang="en-US"/>
           </a:p>
@@ -1352,10 +1340,9 @@
           <a:lstStyle/>
           <a:p>
             <a:r>
-              <a:rPr lang="en-US" smtClean="0"/>
+              <a:rPr lang="en-US"/>
               <a:t>Click to edit Master title style</a:t>
             </a:r>
-            <a:endParaRPr lang="en-US"/>
           </a:p>
         </p:txBody>
       </p:sp>
@@ -1418,7 +1405,7 @@
           <a:p>
             <a:pPr lvl="0"/>
             <a:r>
-              <a:rPr lang="en-US" smtClean="0"/>
+              <a:rPr lang="en-US"/>
               <a:t>Click to edit Master text styles</a:t>
             </a:r>
           </a:p>
@@ -1446,38 +1433,37 @@
           <a:p>
             <a:pPr lvl="0"/>
             <a:r>
-              <a:rPr lang="en-US" smtClean="0"/>
+              <a:rPr lang="en-US"/>
               <a:t>Click to edit Master text styles</a:t>
             </a:r>
           </a:p>
           <a:p>
             <a:pPr lvl="1"/>
             <a:r>
-              <a:rPr lang="en-US" smtClean="0"/>
+              <a:rPr lang="en-US"/>
               <a:t>Second level</a:t>
             </a:r>
           </a:p>
           <a:p>
             <a:pPr lvl="2"/>
             <a:r>
-              <a:rPr lang="en-US" smtClean="0"/>
+              <a:rPr lang="en-US"/>
               <a:t>Third level</a:t>
             </a:r>
           </a:p>
           <a:p>
             <a:pPr lvl="3"/>
             <a:r>
-              <a:rPr lang="en-US" smtClean="0"/>
+              <a:rPr lang="en-US"/>
               <a:t>Fourth level</a:t>
             </a:r>
           </a:p>
           <a:p>
             <a:pPr lvl="4"/>
             <a:r>
-              <a:rPr lang="en-US" smtClean="0"/>
+              <a:rPr lang="en-US"/>
               <a:t>Fifth level</a:t>
             </a:r>
-            <a:endParaRPr lang="en-US"/>
           </a:p>
         </p:txBody>
       </p:sp>
@@ -1540,7 +1526,7 @@
           <a:p>
             <a:pPr lvl="0"/>
             <a:r>
-              <a:rPr lang="en-US" smtClean="0"/>
+              <a:rPr lang="en-US"/>
               <a:t>Click to edit Master text styles</a:t>
             </a:r>
           </a:p>
@@ -1568,38 +1554,37 @@
           <a:p>
             <a:pPr lvl="0"/>
             <a:r>
-              <a:rPr lang="en-US" smtClean="0"/>
+              <a:rPr lang="en-US"/>
               <a:t>Click to edit Master text styles</a:t>
             </a:r>
           </a:p>
           <a:p>
             <a:pPr lvl="1"/>
             <a:r>
-              <a:rPr lang="en-US" smtClean="0"/>
+              <a:rPr lang="en-US"/>
               <a:t>Second level</a:t>
             </a:r>
           </a:p>
           <a:p>
             <a:pPr lvl="2"/>
             <a:r>
-              <a:rPr lang="en-US" smtClean="0"/>
+              <a:rPr lang="en-US"/>
               <a:t>Third level</a:t>
             </a:r>
           </a:p>
           <a:p>
             <a:pPr lvl="3"/>
             <a:r>
-              <a:rPr lang="en-US" smtClean="0"/>
+              <a:rPr lang="en-US"/>
               <a:t>Fourth level</a:t>
             </a:r>
           </a:p>
           <a:p>
             <a:pPr lvl="4"/>
             <a:r>
-              <a:rPr lang="en-US" smtClean="0"/>
+              <a:rPr lang="en-US"/>
               <a:t>Fifth level</a:t>
             </a:r>
-            <a:endParaRPr lang="en-US"/>
           </a:p>
         </p:txBody>
       </p:sp>
@@ -1620,7 +1605,7 @@
           <a:p>
             <a:fld id="{2ED272F6-9B9E-464E-930C-D9DEE297FFC5}" type="datetimeFigureOut">
               <a:rPr lang="en-US" smtClean="0"/>
-              <a:t>6/13/2019</a:t>
+              <a:t>3/11/2021</a:t>
             </a:fld>
             <a:endParaRPr lang="en-US"/>
           </a:p>
@@ -1714,10 +1699,9 @@
           <a:lstStyle/>
           <a:p>
             <a:r>
-              <a:rPr lang="en-US" smtClean="0"/>
+              <a:rPr lang="en-US"/>
               <a:t>Click to edit Master title style</a:t>
             </a:r>
-            <a:endParaRPr lang="en-US"/>
           </a:p>
         </p:txBody>
       </p:sp>
@@ -1738,7 +1722,7 @@
           <a:p>
             <a:fld id="{2ED272F6-9B9E-464E-930C-D9DEE297FFC5}" type="datetimeFigureOut">
               <a:rPr lang="en-US" smtClean="0"/>
-              <a:t>6/13/2019</a:t>
+              <a:t>3/11/2021</a:t>
             </a:fld>
             <a:endParaRPr lang="en-US"/>
           </a:p>
@@ -1833,7 +1817,7 @@
           <a:p>
             <a:fld id="{2ED272F6-9B9E-464E-930C-D9DEE297FFC5}" type="datetimeFigureOut">
               <a:rPr lang="en-US" smtClean="0"/>
-              <a:t>6/13/2019</a:t>
+              <a:t>3/11/2021</a:t>
             </a:fld>
             <a:endParaRPr lang="en-US"/>
           </a:p>
@@ -1936,10 +1920,9 @@
           </a:lstStyle>
           <a:p>
             <a:r>
-              <a:rPr lang="en-US" smtClean="0"/>
+              <a:rPr lang="en-US"/>
               <a:t>Click to edit Master title style</a:t>
             </a:r>
-            <a:endParaRPr lang="en-US"/>
           </a:p>
         </p:txBody>
       </p:sp>
@@ -1993,38 +1976,37 @@
           <a:p>
             <a:pPr lvl="0"/>
             <a:r>
-              <a:rPr lang="en-US" smtClean="0"/>
+              <a:rPr lang="en-US"/>
               <a:t>Click to edit Master text styles</a:t>
             </a:r>
           </a:p>
           <a:p>
             <a:pPr lvl="1"/>
             <a:r>
-              <a:rPr lang="en-US" smtClean="0"/>
+              <a:rPr lang="en-US"/>
               <a:t>Second level</a:t>
             </a:r>
           </a:p>
           <a:p>
             <a:pPr lvl="2"/>
             <a:r>
-              <a:rPr lang="en-US" smtClean="0"/>
+              <a:rPr lang="en-US"/>
               <a:t>Third level</a:t>
             </a:r>
           </a:p>
           <a:p>
             <a:pPr lvl="3"/>
             <a:r>
-              <a:rPr lang="en-US" smtClean="0"/>
+              <a:rPr lang="en-US"/>
               <a:t>Fourth level</a:t>
             </a:r>
           </a:p>
           <a:p>
             <a:pPr lvl="4"/>
             <a:r>
-              <a:rPr lang="en-US" smtClean="0"/>
+              <a:rPr lang="en-US"/>
               <a:t>Fifth level</a:t>
             </a:r>
-            <a:endParaRPr lang="en-US"/>
           </a:p>
         </p:txBody>
       </p:sp>
@@ -2087,7 +2069,7 @@
           <a:p>
             <a:pPr lvl="0"/>
             <a:r>
-              <a:rPr lang="en-US" smtClean="0"/>
+              <a:rPr lang="en-US"/>
               <a:t>Click to edit Master text styles</a:t>
             </a:r>
           </a:p>
@@ -2110,7 +2092,7 @@
           <a:p>
             <a:fld id="{2ED272F6-9B9E-464E-930C-D9DEE297FFC5}" type="datetimeFigureOut">
               <a:rPr lang="en-US" smtClean="0"/>
-              <a:t>6/13/2019</a:t>
+              <a:t>3/11/2021</a:t>
             </a:fld>
             <a:endParaRPr lang="en-US"/>
           </a:p>
@@ -2213,10 +2195,9 @@
           </a:lstStyle>
           <a:p>
             <a:r>
-              <a:rPr lang="en-US" smtClean="0"/>
+              <a:rPr lang="en-US"/>
               <a:t>Click to edit Master title style</a:t>
             </a:r>
-            <a:endParaRPr lang="en-US"/>
           </a:p>
         </p:txBody>
       </p:sp>
@@ -2340,7 +2321,7 @@
           <a:p>
             <a:pPr lvl="0"/>
             <a:r>
-              <a:rPr lang="en-US" smtClean="0"/>
+              <a:rPr lang="en-US"/>
               <a:t>Click to edit Master text styles</a:t>
             </a:r>
           </a:p>
@@ -2363,7 +2344,7 @@
           <a:p>
             <a:fld id="{2ED272F6-9B9E-464E-930C-D9DEE297FFC5}" type="datetimeFigureOut">
               <a:rPr lang="en-US" smtClean="0"/>
-              <a:t>6/13/2019</a:t>
+              <a:t>3/11/2021</a:t>
             </a:fld>
             <a:endParaRPr lang="en-US"/>
           </a:p>
@@ -2472,10 +2453,9 @@
           <a:lstStyle/>
           <a:p>
             <a:r>
-              <a:rPr lang="en-US" smtClean="0"/>
+              <a:rPr lang="en-US"/>
               <a:t>Click to edit Master title style</a:t>
             </a:r>
-            <a:endParaRPr lang="en-US"/>
           </a:p>
         </p:txBody>
       </p:sp>
@@ -2506,38 +2486,37 @@
           <a:p>
             <a:pPr lvl="0"/>
             <a:r>
-              <a:rPr lang="en-US" smtClean="0"/>
+              <a:rPr lang="en-US"/>
               <a:t>Click to edit Master text styles</a:t>
             </a:r>
           </a:p>
           <a:p>
             <a:pPr lvl="1"/>
             <a:r>
-              <a:rPr lang="en-US" smtClean="0"/>
+              <a:rPr lang="en-US"/>
               <a:t>Second level</a:t>
             </a:r>
           </a:p>
           <a:p>
             <a:pPr lvl="2"/>
             <a:r>
-              <a:rPr lang="en-US" smtClean="0"/>
+              <a:rPr lang="en-US"/>
               <a:t>Third level</a:t>
             </a:r>
           </a:p>
           <a:p>
             <a:pPr lvl="3"/>
             <a:r>
-              <a:rPr lang="en-US" smtClean="0"/>
+              <a:rPr lang="en-US"/>
               <a:t>Fourth level</a:t>
             </a:r>
           </a:p>
           <a:p>
             <a:pPr lvl="4"/>
             <a:r>
-              <a:rPr lang="en-US" smtClean="0"/>
+              <a:rPr lang="en-US"/>
               <a:t>Fifth level</a:t>
             </a:r>
-            <a:endParaRPr lang="en-US"/>
           </a:p>
         </p:txBody>
       </p:sp>
@@ -2576,7 +2555,7 @@
           <a:p>
             <a:fld id="{2ED272F6-9B9E-464E-930C-D9DEE297FFC5}" type="datetimeFigureOut">
               <a:rPr lang="en-US" smtClean="0"/>
-              <a:t>6/13/2019</a:t>
+              <a:t>3/11/2021</a:t>
             </a:fld>
             <a:endParaRPr lang="en-US"/>
           </a:p>
@@ -3046,38 +3025,33 @@
             <a:lstStyle/>
             <a:p>
               <a:r>
-                <a:rPr lang="en-US" sz="900" dirty="0" smtClean="0"/>
+                <a:rPr lang="en-US" sz="900" dirty="0"/>
                 <a:t>{{</a:t>
               </a:r>
               <a:r>
-                <a:rPr lang="en-US" sz="900" dirty="0" err="1" smtClean="0"/>
-                <a:t>pptx</a:t>
+                <a:rPr lang="en-US" sz="900" dirty="0" err="1"/>
+                <a:t>pptxImage</a:t>
               </a:r>
               <a:r>
-                <a:rPr lang="en-US" sz="900" dirty="0" err="1" smtClean="0"/>
-                <a:t>Image</a:t>
-              </a:r>
-              <a:r>
-                <a:rPr lang="en-US" sz="900" dirty="0" smtClean="0"/>
+                <a:rPr lang="en-US" sz="900" dirty="0"/>
                 <a:t> </a:t>
               </a:r>
               <a:r>
-                <a:rPr lang="en-US" sz="900" dirty="0" err="1" smtClean="0"/>
+                <a:rPr lang="en-US" sz="900" dirty="0" err="1"/>
                 <a:t>src</a:t>
               </a:r>
               <a:r>
-                <a:rPr lang="en-US" sz="900" dirty="0" smtClean="0"/>
+                <a:rPr lang="en-US" sz="900" dirty="0"/>
                 <a:t>=</a:t>
               </a:r>
               <a:r>
-                <a:rPr lang="en-US" sz="900" dirty="0" err="1" smtClean="0"/>
+                <a:rPr lang="en-US" sz="900" dirty="0" err="1"/>
                 <a:t>src</a:t>
               </a:r>
               <a:r>
-                <a:rPr lang="en-US" sz="900" dirty="0" smtClean="0"/>
+                <a:rPr lang="en-US" sz="900" dirty="0"/>
                 <a:t>}}</a:t>
               </a:r>
-              <a:endParaRPr lang="en-US" sz="900" dirty="0"/>
             </a:p>
           </p:txBody>
         </p:sp>
@@ -3098,13 +3072,126 @@
           <a:lstStyle/>
           <a:p>
             <a:r>
-              <a:rPr lang="en-US" dirty="0" smtClean="0"/>
+              <a:rPr lang="en-US" dirty="0"/>
               <a:t>Title</a:t>
             </a:r>
-            <a:endParaRPr lang="en-US" dirty="0"/>
-          </a:p>
-        </p:txBody>
-      </p:sp>
+          </a:p>
+        </p:txBody>
+      </p:sp>
+      <p:grpSp>
+        <p:nvGrpSpPr>
+          <p:cNvPr id="2" name="Group 1">
+            <a:extLst>
+              <a:ext uri="{FF2B5EF4-FFF2-40B4-BE49-F238E27FC236}">
+                <a16:creationId xmlns:a16="http://schemas.microsoft.com/office/drawing/2014/main" id="{CABC83A7-99A9-4B0E-9FAD-83D11EFECF19}"/>
+              </a:ext>
+            </a:extLst>
+          </p:cNvPr>
+          <p:cNvGrpSpPr/>
+          <p:nvPr/>
+        </p:nvGrpSpPr>
+        <p:grpSpPr>
+          <a:xfrm>
+            <a:off x="7990018" y="3805224"/>
+            <a:ext cx="1752600" cy="1314450"/>
+            <a:chOff x="7874609" y="4036043"/>
+            <a:chExt cx="1752600" cy="1314450"/>
+          </a:xfrm>
+        </p:grpSpPr>
+        <p:pic>
+          <p:nvPicPr>
+            <p:cNvPr id="9" name="Picture 8">
+              <a:extLst>
+                <a:ext uri="{FF2B5EF4-FFF2-40B4-BE49-F238E27FC236}">
+                  <a16:creationId xmlns:a16="http://schemas.microsoft.com/office/drawing/2014/main" id="{C2BC830E-6EDA-40C5-B72F-BE3DCD50B7D7}"/>
+                </a:ext>
+              </a:extLst>
+            </p:cNvPr>
+            <p:cNvPicPr/>
+            <p:nvPr/>
+          </p:nvPicPr>
+          <p:blipFill>
+            <a:blip r:embed="rId2" cstate="print">
+              <a:extLst>
+                <a:ext uri="{28A0092B-C50C-407E-A947-70E740481C1C}">
+                  <a14:useLocalDpi xmlns:a14="http://schemas.microsoft.com/office/drawing/2010/main" val="0"/>
+                </a:ext>
+              </a:extLst>
+            </a:blip>
+            <a:stretch>
+              <a:fillRect/>
+            </a:stretch>
+          </p:blipFill>
+          <p:spPr>
+            <a:xfrm>
+              <a:off x="7874609" y="4036043"/>
+              <a:ext cx="1752600" cy="1314450"/>
+            </a:xfrm>
+            <a:prstGeom prst="rect">
+              <a:avLst/>
+            </a:prstGeom>
+          </p:spPr>
+        </p:pic>
+        <p:sp>
+          <p:nvSpPr>
+            <p:cNvPr id="11" name="TextBox 10">
+              <a:extLst>
+                <a:ext uri="{FF2B5EF4-FFF2-40B4-BE49-F238E27FC236}">
+                  <a16:creationId xmlns:a16="http://schemas.microsoft.com/office/drawing/2014/main" id="{55AA66A2-61DA-450F-B616-A99379FEBB72}"/>
+                </a:ext>
+              </a:extLst>
+            </p:cNvPr>
+            <p:cNvSpPr txBox="1"/>
+            <p:nvPr/>
+          </p:nvSpPr>
+          <p:spPr>
+            <a:xfrm>
+              <a:off x="8134466" y="4936495"/>
+              <a:ext cx="1416907" cy="230832"/>
+            </a:xfrm>
+            <a:prstGeom prst="rect">
+              <a:avLst/>
+            </a:prstGeom>
+            <a:noFill/>
+          </p:spPr>
+          <p:txBody>
+            <a:bodyPr wrap="square" rtlCol="0">
+              <a:spAutoFit/>
+            </a:bodyPr>
+            <a:lstStyle/>
+            <a:p>
+              <a:r>
+                <a:rPr lang="en-US" sz="900" dirty="0"/>
+                <a:t>{{</a:t>
+              </a:r>
+              <a:r>
+                <a:rPr lang="en-US" sz="900" dirty="0" err="1"/>
+                <a:t>pptxImage</a:t>
+              </a:r>
+              <a:r>
+                <a:rPr lang="en-US" sz="900" dirty="0"/>
+                <a:t> </a:t>
+              </a:r>
+              <a:r>
+                <a:rPr lang="en-US" sz="900" dirty="0" err="1"/>
+                <a:t>src</a:t>
+              </a:r>
+              <a:r>
+                <a:rPr lang="en-US" sz="900" dirty="0"/>
+                <a:t>=</a:t>
+              </a:r>
+              <a:r>
+                <a:rPr lang="en-US" sz="900" dirty="0" err="1"/>
+                <a:t>src</a:t>
+              </a:r>
+              <a:r>
+                <a:rPr lang="en-US" sz="900" dirty="0"/>
+                <a:t>}}</a:t>
+              </a:r>
+            </a:p>
+          </p:txBody>
+        </p:sp>
+      </p:grpSp>
     </p:spTree>
     <p:extLst>
       <p:ext uri="{BB962C8B-B14F-4D97-AF65-F5344CB8AC3E}">
@@ -3115,13 +3202,6 @@
   <p:clrMapOvr>
     <a:masterClrMapping/>
   </p:clrMapOvr>
-  <p:timing>
-    <p:tnLst>
-      <p:par>
-        <p:cTn id="1" dur="indefinite" restart="never" nodeType="tmRoot"/>
-      </p:par>
-    </p:tnLst>
-  </p:timing>
 </p:sld>
 </file>
 

</xml_diff>